<commit_message>
abstract and full document cleanup
</commit_message>
<xml_diff>
--- a/figs/figures.pptx
+++ b/figs/figures.pptx
@@ -31713,10 +31713,10 @@
       </p:grpSpPr>
       <p:grpSp>
         <p:nvGrpSpPr>
-          <p:cNvPr id="5" name="Group 4">
-            <a:extLst>
-              <a:ext uri="{FF2B5EF4-FFF2-40B4-BE49-F238E27FC236}">
-                <a16:creationId xmlns:a16="http://schemas.microsoft.com/office/drawing/2014/main" id="{60A51566-2E40-A7E3-C824-529FA873DF1B}"/>
+          <p:cNvPr id="31" name="Group 30">
+            <a:extLst>
+              <a:ext uri="{FF2B5EF4-FFF2-40B4-BE49-F238E27FC236}">
+                <a16:creationId xmlns:a16="http://schemas.microsoft.com/office/drawing/2014/main" id="{B460A834-BCDF-EEF0-DB69-97DAF663A01B}"/>
               </a:ext>
             </a:extLst>
           </p:cNvPr>
@@ -31725,10 +31725,10 @@
         </p:nvGrpSpPr>
         <p:grpSpPr>
           <a:xfrm>
-            <a:off x="1356994" y="1243472"/>
-            <a:ext cx="8314720" cy="4414119"/>
-            <a:chOff x="1356994" y="1243472"/>
-            <a:chExt cx="8314720" cy="4414119"/>
+            <a:off x="1356994" y="1431253"/>
+            <a:ext cx="8314720" cy="3730054"/>
+            <a:chOff x="1356994" y="1431253"/>
+            <a:chExt cx="8314720" cy="3730054"/>
           </a:xfrm>
         </p:grpSpPr>
         <p:sp>
@@ -31745,8 +31745,8 @@
           </p:nvSpPr>
           <p:spPr>
             <a:xfrm>
-              <a:off x="1356994" y="1243472"/>
-              <a:ext cx="8314720" cy="1681317"/>
+              <a:off x="1356994" y="1431253"/>
+              <a:ext cx="8314720" cy="1370495"/>
             </a:xfrm>
             <a:prstGeom prst="roundRect">
               <a:avLst>
@@ -31851,8 +31851,8 @@
           </p:nvSpPr>
           <p:spPr>
             <a:xfrm>
-              <a:off x="3347850" y="1400790"/>
-              <a:ext cx="5834620" cy="471948"/>
+              <a:off x="3347850" y="1547553"/>
+              <a:ext cx="5834620" cy="325184"/>
             </a:xfrm>
             <a:prstGeom prst="rect">
               <a:avLst/>
@@ -31922,7 +31922,7 @@
           <p:spPr>
             <a:xfrm>
               <a:off x="3358540" y="2111168"/>
-              <a:ext cx="749339" cy="663676"/>
+              <a:ext cx="749339" cy="520800"/>
             </a:xfrm>
             <a:prstGeom prst="roundRect">
               <a:avLst>
@@ -32034,7 +32034,7 @@
           <p:spPr>
             <a:xfrm>
               <a:off x="5534258" y="2111168"/>
-              <a:ext cx="943671" cy="663676"/>
+              <a:ext cx="943671" cy="520800"/>
             </a:xfrm>
             <a:prstGeom prst="roundRect">
               <a:avLst>
@@ -32111,7 +32111,7 @@
           <p:spPr>
             <a:xfrm>
               <a:off x="6648234" y="2111167"/>
-              <a:ext cx="681071" cy="658865"/>
+              <a:ext cx="681071" cy="520801"/>
             </a:xfrm>
             <a:prstGeom prst="roundRect">
               <a:avLst>
@@ -32188,7 +32188,7 @@
           <p:spPr>
             <a:xfrm>
               <a:off x="7538526" y="2111167"/>
-              <a:ext cx="696288" cy="658865"/>
+              <a:ext cx="696288" cy="520801"/>
             </a:xfrm>
             <a:prstGeom prst="roundRect">
               <a:avLst>
@@ -32309,8 +32309,8 @@
           </p:nvSpPr>
           <p:spPr>
             <a:xfrm>
-              <a:off x="7354700" y="3415856"/>
-              <a:ext cx="935575" cy="687574"/>
+              <a:off x="7354700" y="3280689"/>
+              <a:ext cx="935575" cy="470522"/>
             </a:xfrm>
             <a:prstGeom prst="roundRect">
               <a:avLst>
@@ -32390,7 +32390,7 @@
           </p:nvCxnSpPr>
           <p:spPr>
             <a:xfrm flipH="1">
-              <a:off x="7065135" y="4717538"/>
+              <a:off x="7065135" y="4296122"/>
               <a:ext cx="286283" cy="1811"/>
             </a:xfrm>
             <a:prstGeom prst="straightConnector1">
@@ -32423,7 +32423,7 @@
           <p:spPr>
             <a:xfrm>
               <a:off x="4244622" y="2111168"/>
-              <a:ext cx="1131524" cy="663676"/>
+              <a:ext cx="1131524" cy="520800"/>
             </a:xfrm>
             <a:prstGeom prst="roundRect">
               <a:avLst>
@@ -32503,7 +32503,7 @@
           </p:nvCxnSpPr>
           <p:spPr>
             <a:xfrm flipH="1">
-              <a:off x="5376146" y="2443006"/>
+              <a:off x="5376146" y="2371568"/>
               <a:ext cx="158112" cy="0"/>
             </a:xfrm>
             <a:prstGeom prst="straightConnector1">
@@ -32569,7 +32569,7 @@
           </p:nvSpPr>
           <p:spPr>
             <a:xfrm>
-              <a:off x="4619090" y="4440460"/>
+              <a:off x="4619090" y="4019044"/>
               <a:ext cx="1129455" cy="557778"/>
             </a:xfrm>
             <a:prstGeom prst="roundRect">
@@ -32660,7 +32660,7 @@
           </p:nvSpPr>
           <p:spPr>
             <a:xfrm>
-              <a:off x="3214005" y="4440460"/>
+              <a:off x="3214005" y="4019044"/>
               <a:ext cx="1045657" cy="557778"/>
             </a:xfrm>
             <a:prstGeom prst="roundRect">
@@ -32732,7 +32732,7 @@
           </p:nvSpPr>
           <p:spPr>
             <a:xfrm>
-              <a:off x="6135360" y="4440460"/>
+              <a:off x="6135360" y="4019044"/>
               <a:ext cx="929775" cy="557778"/>
             </a:xfrm>
             <a:prstGeom prst="roundRect">
@@ -32861,7 +32861,7 @@
           </p:nvCxnSpPr>
           <p:spPr>
             <a:xfrm>
-              <a:off x="4259662" y="4719349"/>
+              <a:off x="4259662" y="4297933"/>
               <a:ext cx="359428" cy="0"/>
             </a:xfrm>
             <a:prstGeom prst="straightConnector1">
@@ -32897,7 +32897,7 @@
           </p:nvCxnSpPr>
           <p:spPr>
             <a:xfrm flipH="1">
-              <a:off x="5748545" y="4719349"/>
+              <a:off x="5748545" y="4297933"/>
               <a:ext cx="386815" cy="0"/>
             </a:xfrm>
             <a:prstGeom prst="straightConnector1">
@@ -32929,8 +32929,8 @@
           </p:nvSpPr>
           <p:spPr>
             <a:xfrm>
-              <a:off x="3248325" y="3405920"/>
-              <a:ext cx="965102" cy="687574"/>
+              <a:off x="3248325" y="3270753"/>
+              <a:ext cx="965102" cy="480458"/>
             </a:xfrm>
             <a:prstGeom prst="rect">
               <a:avLst/>
@@ -33003,8 +33003,8 @@
           </p:nvCxnSpPr>
           <p:spPr>
             <a:xfrm flipH="1">
-              <a:off x="3730876" y="2774844"/>
-              <a:ext cx="2334" cy="631076"/>
+              <a:off x="3730876" y="2631968"/>
+              <a:ext cx="2334" cy="638785"/>
             </a:xfrm>
             <a:prstGeom prst="straightConnector1">
               <a:avLst/>
@@ -33035,8 +33035,8 @@
           </p:nvSpPr>
           <p:spPr>
             <a:xfrm>
-              <a:off x="6135361" y="3415856"/>
-              <a:ext cx="935579" cy="687574"/>
+              <a:off x="6135361" y="3280689"/>
+              <a:ext cx="935579" cy="463278"/>
             </a:xfrm>
             <a:prstGeom prst="rect">
               <a:avLst/>
@@ -33144,9 +33144,9 @@
             <p:nvPr/>
           </p:nvCxnSpPr>
           <p:spPr>
-            <a:xfrm flipH="1">
-              <a:off x="7070940" y="3759643"/>
-              <a:ext cx="283760" cy="0"/>
+            <a:xfrm flipH="1" flipV="1">
+              <a:off x="7070940" y="3512328"/>
+              <a:ext cx="283760" cy="3622"/>
             </a:xfrm>
             <a:prstGeom prst="straightConnector1">
               <a:avLst/>
@@ -33181,8 +33181,8 @@
           </p:nvCxnSpPr>
           <p:spPr>
             <a:xfrm flipH="1">
-              <a:off x="6600248" y="4103430"/>
-              <a:ext cx="2903" cy="337030"/>
+              <a:off x="6600248" y="3743967"/>
+              <a:ext cx="2903" cy="275077"/>
             </a:xfrm>
             <a:prstGeom prst="straightConnector1">
               <a:avLst/>
@@ -33213,8 +33213,8 @@
           </p:nvSpPr>
           <p:spPr>
             <a:xfrm>
-              <a:off x="3799941" y="5306681"/>
-              <a:ext cx="2771820" cy="350910"/>
+              <a:off x="3799941" y="4853461"/>
+              <a:ext cx="2771820" cy="307846"/>
             </a:xfrm>
             <a:prstGeom prst="rect">
               <a:avLst/>
@@ -33286,8 +33286,8 @@
           </p:nvCxnSpPr>
           <p:spPr>
             <a:xfrm>
-              <a:off x="2425691" y="4093368"/>
-              <a:ext cx="782357" cy="411957"/>
+              <a:off x="2425691" y="3751211"/>
+              <a:ext cx="822634" cy="277079"/>
             </a:xfrm>
             <a:prstGeom prst="straightConnector1">
               <a:avLst/>
@@ -33350,8 +33350,8 @@
           </p:nvSpPr>
           <p:spPr>
             <a:xfrm>
-              <a:off x="1797718" y="3405794"/>
-              <a:ext cx="1255945" cy="687574"/>
+              <a:off x="1797718" y="3270627"/>
+              <a:ext cx="1255945" cy="480584"/>
             </a:xfrm>
             <a:prstGeom prst="rect">
               <a:avLst/>
@@ -33426,7 +33426,7 @@
           </p:nvSpPr>
           <p:spPr>
             <a:xfrm>
-              <a:off x="7351418" y="4438650"/>
+              <a:off x="7351418" y="4017234"/>
               <a:ext cx="1277896" cy="557776"/>
             </a:xfrm>
             <a:prstGeom prst="rect">
@@ -33505,8 +33505,8 @@
           </p:nvCxnSpPr>
           <p:spPr>
             <a:xfrm>
-              <a:off x="3730876" y="4093494"/>
-              <a:ext cx="5958" cy="346966"/>
+              <a:off x="3730876" y="3751211"/>
+              <a:ext cx="5958" cy="267833"/>
             </a:xfrm>
             <a:prstGeom prst="straightConnector1">
               <a:avLst/>
@@ -33537,7 +33537,7 @@
           </p:nvSpPr>
           <p:spPr>
             <a:xfrm>
-              <a:off x="1832512" y="4438649"/>
+              <a:off x="1832512" y="4017233"/>
               <a:ext cx="1126680" cy="557779"/>
             </a:xfrm>
             <a:prstGeom prst="rect">
@@ -33616,12 +33616,12 @@
           </p:nvCxnSpPr>
           <p:spPr>
             <a:xfrm flipH="1">
-              <a:off x="8290275" y="1636764"/>
-              <a:ext cx="892195" cy="2122879"/>
+              <a:off x="8290275" y="1710145"/>
+              <a:ext cx="892195" cy="1805805"/>
             </a:xfrm>
             <a:prstGeom prst="bentConnector3">
               <a:avLst>
-                <a:gd name="adj1" fmla="val -30078"/>
+                <a:gd name="adj1" fmla="val -25622"/>
               </a:avLst>
             </a:prstGeom>
             <a:noFill/>
@@ -33654,7 +33654,7 @@
           </p:nvCxnSpPr>
           <p:spPr>
             <a:xfrm>
-              <a:off x="2959192" y="4717539"/>
+              <a:off x="2959192" y="4296123"/>
               <a:ext cx="254813" cy="1810"/>
             </a:xfrm>
             <a:prstGeom prst="straightConnector1">
@@ -33721,8 +33721,8 @@
           </p:nvSpPr>
           <p:spPr>
             <a:xfrm>
-              <a:off x="4619090" y="3415856"/>
-              <a:ext cx="1129455" cy="687574"/>
+              <a:off x="4619090" y="3280689"/>
+              <a:ext cx="1129455" cy="470522"/>
             </a:xfrm>
             <a:prstGeom prst="rect">
               <a:avLst/>
@@ -33842,14 +33842,13 @@
             <p:cNvCxnSpPr>
               <a:cxnSpLocks/>
               <a:stCxn id="62" idx="2"/>
-              <a:endCxn id="170" idx="0"/>
             </p:cNvCxnSpPr>
             <p:nvPr/>
           </p:nvCxnSpPr>
           <p:spPr>
             <a:xfrm>
-              <a:off x="3733210" y="2774844"/>
-              <a:ext cx="1450608" cy="641012"/>
+              <a:off x="3733210" y="2631968"/>
+              <a:ext cx="885880" cy="648720"/>
             </a:xfrm>
             <a:prstGeom prst="straightConnector1">
               <a:avLst/>
@@ -33884,8 +33883,8 @@
           </p:nvCxnSpPr>
           <p:spPr>
             <a:xfrm flipV="1">
-              <a:off x="8234814" y="2438201"/>
-              <a:ext cx="229183" cy="2399"/>
+              <a:off x="8234814" y="2368650"/>
+              <a:ext cx="229183" cy="2918"/>
             </a:xfrm>
             <a:prstGeom prst="straightConnector1">
               <a:avLst/>
@@ -33920,8 +33919,8 @@
           </p:nvCxnSpPr>
           <p:spPr>
             <a:xfrm>
-              <a:off x="5183818" y="4103430"/>
-              <a:ext cx="0" cy="337030"/>
+              <a:off x="5183818" y="3751211"/>
+              <a:ext cx="0" cy="267833"/>
             </a:xfrm>
             <a:prstGeom prst="straightConnector1">
               <a:avLst/>
@@ -33952,8 +33951,8 @@
           </p:nvSpPr>
           <p:spPr>
             <a:xfrm>
-              <a:off x="8463997" y="2105330"/>
-              <a:ext cx="840177" cy="665741"/>
+              <a:off x="8463997" y="2105331"/>
+              <a:ext cx="840177" cy="526638"/>
             </a:xfrm>
             <a:prstGeom prst="foldedCorner">
               <a:avLst/>
@@ -34039,7 +34038,7 @@
           </p:nvCxnSpPr>
           <p:spPr>
             <a:xfrm>
-              <a:off x="7329305" y="2440600"/>
+              <a:off x="7329305" y="2371568"/>
               <a:ext cx="209221" cy="0"/>
             </a:xfrm>
             <a:prstGeom prst="straightConnector1">
@@ -34071,8 +34070,8 @@
           </p:nvSpPr>
           <p:spPr>
             <a:xfrm>
-              <a:off x="1356994" y="3046145"/>
-              <a:ext cx="8314720" cy="2117660"/>
+              <a:off x="1356994" y="2910978"/>
+              <a:ext cx="8314720" cy="1812102"/>
             </a:xfrm>
             <a:prstGeom prst="roundRect">
               <a:avLst>
@@ -34146,8 +34145,8 @@
           </p:nvCxnSpPr>
           <p:spPr>
             <a:xfrm flipV="1">
-              <a:off x="7886670" y="2770032"/>
-              <a:ext cx="0" cy="276114"/>
+              <a:off x="7886670" y="2631968"/>
+              <a:ext cx="0" cy="279010"/>
             </a:xfrm>
             <a:prstGeom prst="straightConnector1">
               <a:avLst/>
@@ -34182,8 +34181,8 @@
           </p:nvCxnSpPr>
           <p:spPr>
             <a:xfrm flipH="1" flipV="1">
-              <a:off x="5183818" y="4998238"/>
-              <a:ext cx="2033" cy="308443"/>
+              <a:off x="5183818" y="4576822"/>
+              <a:ext cx="2033" cy="276639"/>
             </a:xfrm>
             <a:prstGeom prst="straightConnector1">
               <a:avLst/>

</xml_diff>